<commit_message>
Review lecture 1 (studying for final)
</commit_message>
<xml_diff>
--- a/Lectures/Lecture 01_Introduction.pptx
+++ b/Lectures/Lecture 01_Introduction.pptx
@@ -249,7 +249,7 @@
           <a:p>
             <a:fld id="{3FE918EF-26F2-F641-9B39-65E2E78847ED}" type="datetimeFigureOut">
               <a:rPr lang="en-US" smtClean="0"/>
-              <a:t>2/25/24</a:t>
+              <a:t>4/29/24</a:t>
             </a:fld>
             <a:endParaRPr lang="en-US"/>
           </a:p>
@@ -1395,7 +1395,7 @@
             <a:fld id="{23A271A1-F6D6-438B-A432-4747EE7ECD40}" type="datetimeFigureOut">
               <a:rPr lang="en-US" smtClean="0"/>
               <a:pPr algn="ctr" eaLnBrk="1" latinLnBrk="0" hangingPunct="1"/>
-              <a:t>2/25/24</a:t>
+              <a:t>4/29/24</a:t>
             </a:fld>
             <a:endParaRPr lang="en-US" sz="2000" dirty="0">
               <a:solidFill>
@@ -1601,7 +1601,7 @@
             <a:fld id="{23A271A1-F6D6-438B-A432-4747EE7ECD40}" type="datetimeFigureOut">
               <a:rPr lang="en-US" smtClean="0"/>
               <a:pPr eaLnBrk="1" latinLnBrk="0" hangingPunct="1"/>
-              <a:t>2/25/24</a:t>
+              <a:t>4/29/24</a:t>
             </a:fld>
             <a:endParaRPr lang="en-US"/>
           </a:p>
@@ -1788,7 +1788,7 @@
             <a:fld id="{23A271A1-F6D6-438B-A432-4747EE7ECD40}" type="datetimeFigureOut">
               <a:rPr lang="en-US" smtClean="0"/>
               <a:pPr eaLnBrk="1" latinLnBrk="0" hangingPunct="1"/>
-              <a:t>2/25/24</a:t>
+              <a:t>4/29/24</a:t>
             </a:fld>
             <a:endParaRPr lang="en-US" dirty="0"/>
           </a:p>
@@ -2053,7 +2053,7 @@
             <a:fld id="{23A271A1-F6D6-438B-A432-4747EE7ECD40}" type="datetimeFigureOut">
               <a:rPr lang="en-US" smtClean="0"/>
               <a:pPr eaLnBrk="1" latinLnBrk="0" hangingPunct="1"/>
-              <a:t>2/25/24</a:t>
+              <a:t>4/29/24</a:t>
             </a:fld>
             <a:endParaRPr lang="en-US" dirty="0"/>
           </a:p>
@@ -2475,7 +2475,7 @@
             <a:fld id="{23A271A1-F6D6-438B-A432-4747EE7ECD40}" type="datetimeFigureOut">
               <a:rPr lang="en-US" smtClean="0"/>
               <a:pPr eaLnBrk="1" latinLnBrk="0" hangingPunct="1"/>
-              <a:t>2/25/24</a:t>
+              <a:t>4/29/24</a:t>
             </a:fld>
             <a:endParaRPr lang="en-US"/>
           </a:p>
@@ -2724,7 +2724,7 @@
             <a:fld id="{23A271A1-F6D6-438B-A432-4747EE7ECD40}" type="datetimeFigureOut">
               <a:rPr lang="en-US" smtClean="0"/>
               <a:pPr eaLnBrk="1" latinLnBrk="0" hangingPunct="1"/>
-              <a:t>2/25/24</a:t>
+              <a:t>4/29/24</a:t>
             </a:fld>
             <a:endParaRPr lang="en-US"/>
           </a:p>
@@ -2963,7 +2963,7 @@
             <a:fld id="{23A271A1-F6D6-438B-A432-4747EE7ECD40}" type="datetimeFigureOut">
               <a:rPr lang="en-US" smtClean="0"/>
               <a:pPr eaLnBrk="1" latinLnBrk="0" hangingPunct="1"/>
-              <a:t>2/25/24</a:t>
+              <a:t>4/29/24</a:t>
             </a:fld>
             <a:endParaRPr lang="en-US"/>
           </a:p>
@@ -3161,7 +3161,7 @@
             <a:fld id="{23A271A1-F6D6-438B-A432-4747EE7ECD40}" type="datetimeFigureOut">
               <a:rPr lang="en-US" smtClean="0"/>
               <a:pPr eaLnBrk="1" latinLnBrk="0" hangingPunct="1"/>
-              <a:t>2/25/24</a:t>
+              <a:t>4/29/24</a:t>
             </a:fld>
             <a:endParaRPr lang="en-US"/>
           </a:p>
@@ -3266,7 +3266,7 @@
             <a:fld id="{23A271A1-F6D6-438B-A432-4747EE7ECD40}" type="datetimeFigureOut">
               <a:rPr lang="en-US" smtClean="0"/>
               <a:pPr eaLnBrk="1" latinLnBrk="0" hangingPunct="1"/>
-              <a:t>2/25/24</a:t>
+              <a:t>4/29/24</a:t>
             </a:fld>
             <a:endParaRPr lang="en-US"/>
           </a:p>
@@ -3408,7 +3408,7 @@
             <a:fld id="{23A271A1-F6D6-438B-A432-4747EE7ECD40}" type="datetimeFigureOut">
               <a:rPr lang="en-US" smtClean="0"/>
               <a:pPr eaLnBrk="1" latinLnBrk="0" hangingPunct="1"/>
-              <a:t>2/25/24</a:t>
+              <a:t>4/29/24</a:t>
             </a:fld>
             <a:endParaRPr lang="en-US"/>
           </a:p>
@@ -3932,7 +3932,7 @@
             <a:fld id="{23A271A1-F6D6-438B-A432-4747EE7ECD40}" type="datetimeFigureOut">
               <a:rPr lang="en-US" smtClean="0"/>
               <a:pPr eaLnBrk="1" latinLnBrk="0" hangingPunct="1"/>
-              <a:t>2/25/24</a:t>
+              <a:t>4/29/24</a:t>
             </a:fld>
             <a:endParaRPr lang="en-US"/>
           </a:p>
@@ -4195,7 +4195,7 @@
             <a:fld id="{23A271A1-F6D6-438B-A432-4747EE7ECD40}" type="datetimeFigureOut">
               <a:rPr lang="en-US" smtClean="0"/>
               <a:pPr eaLnBrk="1" latinLnBrk="0" hangingPunct="1"/>
-              <a:t>2/25/24</a:t>
+              <a:t>4/29/24</a:t>
             </a:fld>
             <a:endParaRPr lang="en-US" sz="1400" dirty="0">
               <a:solidFill>
@@ -17190,8 +17190,8 @@
           </a:p>
         </p:txBody>
       </p:sp>
-      <mc:AlternateContent xmlns:mc="http://schemas.openxmlformats.org/markup-compatibility/2006">
-        <mc:Choice xmlns:a14="http://schemas.microsoft.com/office/drawing/2010/main" Requires="a14">
+      <mc:AlternateContent xmlns:mc="http://schemas.openxmlformats.org/markup-compatibility/2006" xmlns:a14="http://schemas.microsoft.com/office/drawing/2010/main">
+        <mc:Choice Requires="a14">
           <p:sp>
             <p:nvSpPr>
               <p:cNvPr id="4" name="Content Placeholder 2">
@@ -17611,7 +17611,7 @@
             </p:txBody>
           </p:sp>
         </mc:Choice>
-        <mc:Fallback>
+        <mc:Fallback xmlns="">
           <p:sp>
             <p:nvSpPr>
               <p:cNvPr id="4" name="Content Placeholder 2">

</xml_diff>